<commit_message>
Remove space around : and other minor typos
</commit_message>
<xml_diff>
--- a/tutorial-09-perf_tuning.pptx
+++ b/tutorial-09-perf_tuning.pptx
@@ -209,7 +209,7 @@
           <a:p>
             <a:fld id="{775CE290-E0F5-444C-B849-A8F17CD4104C}" type="datetimeFigureOut">
               <a:rPr lang="en-US" smtClean="0"/>
-              <a:t>9/8/14</a:t>
+              <a:t>9/9/14</a:t>
             </a:fld>
             <a:endParaRPr lang="en-US"/>
           </a:p>
@@ -375,7 +375,7 @@
           <a:p>
             <a:fld id="{AD53A24C-4135-094C-957B-35852E7EDFA4}" type="datetimeFigureOut">
               <a:rPr lang="en-US" smtClean="0"/>
-              <a:t>9/8/14</a:t>
+              <a:t>9/9/14</a:t>
             </a:fld>
             <a:endParaRPr lang="en-US"/>
           </a:p>
@@ -836,7 +836,7 @@
           <a:p>
             <a:fld id="{B594EA25-E4F4-3746-A0BA-A11E27330E0F}" type="datetime2">
               <a:rPr lang="en-US" smtClean="0"/>
-              <a:t>Monday, September 8, 14</a:t>
+              <a:t>Tuesday, September 9, 14</a:t>
             </a:fld>
             <a:endParaRPr lang="en-US"/>
           </a:p>
@@ -1139,7 +1139,7 @@
                 <a:latin typeface="Times New Roman"/>
                 <a:cs typeface="Times New Roman"/>
               </a:rPr>
-              <a:t>September 8, 2014</a:t>
+              <a:t>September 9, 2014</a:t>
             </a:fld>
             <a:endParaRPr lang="en-US" dirty="0">
               <a:latin typeface="Times New Roman"/>
@@ -1426,7 +1426,7 @@
           <a:p>
             <a:fld id="{EA699BF9-66CB-F244-8E74-7B1BE1C77046}" type="datetime2">
               <a:rPr lang="en-US" smtClean="0"/>
-              <a:t>Monday, September 8, 14</a:t>
+              <a:t>Tuesday, September 9, 14</a:t>
             </a:fld>
             <a:endParaRPr lang="en-US"/>
           </a:p>
@@ -1737,7 +1737,7 @@
           <a:p>
             <a:fld id="{D300BE84-9843-8B4F-B3C8-647B06AC46C9}" type="datetime2">
               <a:rPr lang="en-US" smtClean="0"/>
-              <a:t>Monday, September 8, 14</a:t>
+              <a:t>Tuesday, September 9, 14</a:t>
             </a:fld>
             <a:endParaRPr lang="en-US"/>
           </a:p>
@@ -1908,7 +1908,7 @@
           <a:p>
             <a:fld id="{C460AE39-2092-A945-8296-F25085B9A0F1}" type="datetime2">
               <a:rPr lang="en-US" smtClean="0"/>
-              <a:t>Monday, September 8, 14</a:t>
+              <a:t>Tuesday, September 9, 14</a:t>
             </a:fld>
             <a:endParaRPr lang="en-US"/>
           </a:p>
@@ -2089,7 +2089,7 @@
           <a:p>
             <a:fld id="{63BC7E9D-3218-5E49-A867-E087AB2F4618}" type="datetime2">
               <a:rPr lang="en-US" smtClean="0"/>
-              <a:t>Monday, September 8, 14</a:t>
+              <a:t>Tuesday, September 9, 14</a:t>
             </a:fld>
             <a:endParaRPr lang="en-US"/>
           </a:p>
@@ -2260,7 +2260,7 @@
           <a:p>
             <a:fld id="{34621E95-60A9-FF44-9869-513D9D7A859F}" type="datetime2">
               <a:rPr lang="en-US" smtClean="0"/>
-              <a:t>Monday, September 8, 14</a:t>
+              <a:t>Tuesday, September 9, 14</a:t>
             </a:fld>
             <a:endParaRPr lang="en-US"/>
           </a:p>
@@ -2379,7 +2379,7 @@
           <a:p>
             <a:fld id="{BD5AFB16-13FE-DF4A-8CB7-09756A57B2EA}" type="datetime2">
               <a:rPr lang="en-US" smtClean="0"/>
-              <a:t>Monday, September 8, 14</a:t>
+              <a:t>Tuesday, September 9, 14</a:t>
             </a:fld>
             <a:endParaRPr lang="en-US" dirty="0"/>
           </a:p>
@@ -2866,7 +2866,7 @@
           <a:p>
             <a:fld id="{1BDEC705-8EA9-6C46-8E3B-2CAC7E2C0F7D}" type="datetime2">
               <a:rPr lang="en-US" smtClean="0"/>
-              <a:t>Monday, September 8, 14</a:t>
+              <a:t>Tuesday, September 9, 14</a:t>
             </a:fld>
             <a:endParaRPr lang="en-US"/>
           </a:p>
@@ -3197,7 +3197,7 @@
           <a:p>
             <a:fld id="{BF613BD3-C5FD-9543-B738-679BF38D8C83}" type="datetime2">
               <a:rPr lang="en-US" smtClean="0"/>
-              <a:t>Monday, September 8, 14</a:t>
+              <a:t>Tuesday, September 9, 14</a:t>
             </a:fld>
             <a:endParaRPr lang="en-US" dirty="0"/>
           </a:p>
@@ -3676,7 +3676,7 @@
           <a:p>
             <a:fld id="{4B5E4F0C-9A9C-5448-99FD-D30288B385C9}" type="datetime2">
               <a:rPr lang="en-US" smtClean="0"/>
-              <a:t>Monday, September 8, 14</a:t>
+              <a:t>Tuesday, September 9, 14</a:t>
             </a:fld>
             <a:endParaRPr lang="en-US"/>
           </a:p>
@@ -3972,7 +3972,7 @@
           <a:p>
             <a:fld id="{30545249-FD76-6844-B252-CAB05FC2DAA8}" type="datetime2">
               <a:rPr lang="en-US" smtClean="0"/>
-              <a:t>Monday, September 8, 14</a:t>
+              <a:t>Tuesday, September 9, 14</a:t>
             </a:fld>
             <a:endParaRPr lang="en-US" dirty="0"/>
           </a:p>
@@ -4216,7 +4216,7 @@
           <a:p>
             <a:fld id="{CC859171-EEDD-0B48-A5C0-E7218AE20EA7}" type="datetime2">
               <a:rPr lang="en-US" smtClean="0"/>
-              <a:t>Monday, September 8, 14</a:t>
+              <a:t>Tuesday, September 9, 14</a:t>
             </a:fld>
             <a:endParaRPr lang="en-US"/>
           </a:p>
@@ -4312,7 +4312,7 @@
           <a:p>
             <a:fld id="{C32F9216-0342-7440-9504-BD6C1382BF27}" type="datetime2">
               <a:rPr lang="en-US" smtClean="0"/>
-              <a:t>Monday, September 8, 14</a:t>
+              <a:t>Tuesday, September 9, 14</a:t>
             </a:fld>
             <a:endParaRPr lang="en-US"/>
           </a:p>
@@ -4583,7 +4583,7 @@
           <a:p>
             <a:fld id="{D36DC8F2-AD63-E841-8C23-5DC3A41041BE}" type="datetime2">
               <a:rPr lang="en-US" smtClean="0"/>
-              <a:t>Monday, September 8, 14</a:t>
+              <a:t>Tuesday, September 9, 14</a:t>
             </a:fld>
             <a:endParaRPr lang="en-US" dirty="0"/>
           </a:p>
@@ -5302,7 +5302,7 @@
           <a:p>
             <a:fld id="{7DCE861A-EA6B-EA43-8AA5-DB216DBB40BC}" type="datetime2">
               <a:rPr lang="en-US" smtClean="0"/>
-              <a:t>Monday, September 8, 14</a:t>
+              <a:t>Tuesday, September 9, 14</a:t>
             </a:fld>
             <a:endParaRPr lang="en-US"/>
           </a:p>
@@ -5520,17 +5520,44 @@
             </a:r>
             <a:r>
               <a:rPr lang="en-US" dirty="0"/>
-              <a:t>program with -</a:t>
-            </a:r>
-            <a:r>
-              <a:rPr lang="en-US" dirty="0" err="1"/>
+              <a:t>program with </a:t>
+            </a:r>
+            <a:r>
+              <a:rPr lang="en-US" dirty="0">
+                <a:latin typeface="Consolas"/>
+                <a:cs typeface="Consolas"/>
+              </a:rPr>
+              <a:t>-</a:t>
+            </a:r>
+            <a:r>
+              <a:rPr lang="en-US" dirty="0" err="1">
+                <a:latin typeface="Consolas"/>
+                <a:cs typeface="Consolas"/>
+              </a:rPr>
               <a:t>tracemode</a:t>
             </a:r>
             <a:r>
+              <a:rPr lang="en-US" dirty="0">
+                <a:latin typeface="Consolas"/>
+                <a:cs typeface="Consolas"/>
+              </a:rPr>
+              <a:t> projections </a:t>
+            </a:r>
+            <a:r>
               <a:rPr lang="en-US" dirty="0"/>
-              <a:t> projections or summary </a:t>
-            </a:r>
-            <a:endParaRPr lang="en-US" dirty="0" smtClean="0"/>
+              <a:t>or </a:t>
+            </a:r>
+            <a:r>
+              <a:rPr lang="en-US" dirty="0">
+                <a:latin typeface="Consolas"/>
+                <a:cs typeface="Consolas"/>
+              </a:rPr>
+              <a:t>summary </a:t>
+            </a:r>
+            <a:endParaRPr lang="en-US" dirty="0" smtClean="0">
+              <a:latin typeface="Consolas"/>
+              <a:cs typeface="Consolas"/>
+            </a:endParaRPr>
           </a:p>
           <a:p>
             <a:pPr lvl="1"/>
@@ -5579,7 +5606,15 @@
             </a:r>
             <a:r>
               <a:rPr lang="en-US" dirty="0"/>
-              <a:t>rich set of tool features : time profile, time lines, usage profile</a:t>
+              <a:t>rich set of tool </a:t>
+            </a:r>
+            <a:r>
+              <a:rPr lang="en-US" dirty="0" smtClean="0"/>
+              <a:t>features: </a:t>
+            </a:r>
+            <a:r>
+              <a:rPr lang="en-US" dirty="0"/>
+              <a:t>time profile, time lines, usage profile</a:t>
             </a:r>
             <a:r>
               <a:rPr lang="en-US" dirty="0" smtClean="0"/>
@@ -5641,7 +5676,7 @@
           <a:p>
             <a:fld id="{34621E95-60A9-FF44-9869-513D9D7A859F}" type="datetime2">
               <a:rPr lang="en-US" smtClean="0"/>
-              <a:t>Monday, September 8, 14</a:t>
+              <a:t>Tuesday, September 9, 14</a:t>
             </a:fld>
             <a:endParaRPr lang="en-US"/>
           </a:p>
@@ -5837,8 +5872,12 @@
               <a:t> </a:t>
             </a:r>
             <a:r>
+              <a:rPr lang="en-US" dirty="0" smtClean="0"/>
+              <a:t>analysis: </a:t>
+            </a:r>
+            <a:r>
               <a:rPr lang="en-US" dirty="0"/>
-              <a:t>analysis : identifies outliers</a:t>
+              <a:t>identifies outliers</a:t>
             </a:r>
           </a:p>
           <a:p>
@@ -5848,8 +5887,12 @@
               <a:t>Noise </a:t>
             </a:r>
             <a:r>
+              <a:rPr lang="en-US" dirty="0" smtClean="0"/>
+              <a:t>miner: </a:t>
+            </a:r>
+            <a:r>
               <a:rPr lang="en-US" dirty="0"/>
-              <a:t>miner : highlights probable interference</a:t>
+              <a:t>highlights probable interference</a:t>
             </a:r>
           </a:p>
         </p:txBody>
@@ -5871,7 +5914,7 @@
           <a:p>
             <a:fld id="{34621E95-60A9-FF44-9869-513D9D7A859F}" type="datetime2">
               <a:rPr lang="en-US" smtClean="0"/>
-              <a:t>Monday, September 8, 14</a:t>
+              <a:t>Tuesday, September 9, 14</a:t>
             </a:fld>
             <a:endParaRPr lang="en-US"/>
           </a:p>
@@ -6006,8 +6049,12 @@
               <a:t>Time </a:t>
             </a:r>
             <a:r>
+              <a:rPr lang="en-US" dirty="0" smtClean="0"/>
+              <a:t>profile: </a:t>
+            </a:r>
+            <a:r>
               <a:rPr lang="en-US" dirty="0"/>
-              <a:t>profile : lower CPU usage </a:t>
+              <a:t>lower CPU usage </a:t>
             </a:r>
             <a:endParaRPr lang="en-US" dirty="0" smtClean="0"/>
           </a:p>
@@ -6053,11 +6100,11 @@
             <a:pPr lvl="1"/>
             <a:r>
               <a:rPr lang="en-US" dirty="0" smtClean="0"/>
-              <a:t>Histogram </a:t>
+              <a:t>Histogram: </a:t>
             </a:r>
             <a:r>
               <a:rPr lang="en-US" dirty="0"/>
-              <a:t>: grain size issues</a:t>
+              <a:t>grain size issues</a:t>
             </a:r>
           </a:p>
         </p:txBody>
@@ -6079,7 +6126,7 @@
           <a:p>
             <a:fld id="{34621E95-60A9-FF44-9869-513D9D7A859F}" type="datetime2">
               <a:rPr lang="en-US" smtClean="0"/>
-              <a:t>Monday, September 8, 14</a:t>
+              <a:t>Tuesday, September 9, 14</a:t>
             </a:fld>
             <a:endParaRPr lang="en-US"/>
           </a:p>
@@ -6271,7 +6318,7 @@
           <a:p>
             <a:fld id="{34621E95-60A9-FF44-9869-513D9D7A859F}" type="datetime2">
               <a:rPr lang="en-US" smtClean="0"/>
-              <a:t>Monday, September 8, 14</a:t>
+              <a:t>Tuesday, September 9, 14</a:t>
             </a:fld>
             <a:endParaRPr lang="en-US"/>
           </a:p>
@@ -6421,7 +6468,7 @@
           <a:p>
             <a:fld id="{34621E95-60A9-FF44-9869-513D9D7A859F}" type="datetime2">
               <a:rPr lang="en-US" smtClean="0"/>
-              <a:t>Monday, September 8, 14</a:t>
+              <a:t>Tuesday, September 9, 14</a:t>
             </a:fld>
             <a:endParaRPr lang="en-US"/>
           </a:p>
@@ -6575,7 +6622,7 @@
           <a:p>
             <a:fld id="{34621E95-60A9-FF44-9869-513D9D7A859F}" type="datetime2">
               <a:rPr lang="en-US" smtClean="0"/>
-              <a:t>Monday, September 8, 14</a:t>
+              <a:t>Tuesday, September 9, 14</a:t>
             </a:fld>
             <a:endParaRPr lang="en-US"/>
           </a:p>
@@ -6725,7 +6772,7 @@
           <a:p>
             <a:fld id="{34621E95-60A9-FF44-9869-513D9D7A859F}" type="datetime2">
               <a:rPr lang="en-US" smtClean="0"/>
-              <a:t>Monday, September 8, 14</a:t>
+              <a:t>Tuesday, September 9, 14</a:t>
             </a:fld>
             <a:endParaRPr lang="en-US"/>
           </a:p>
@@ -6875,7 +6922,7 @@
           <a:p>
             <a:fld id="{34621E95-60A9-FF44-9869-513D9D7A859F}" type="datetime2">
               <a:rPr lang="en-US" smtClean="0"/>
-              <a:t>Monday, September 8, 14</a:t>
+              <a:t>Tuesday, September 9, 14</a:t>
             </a:fld>
             <a:endParaRPr lang="en-US"/>
           </a:p>

</xml_diff>

<commit_message>
tut 9: cleanup language
</commit_message>
<xml_diff>
--- a/tutorial-09-perf_tuning.pptx
+++ b/tutorial-09-perf_tuning.pptx
@@ -209,7 +209,7 @@
           <a:p>
             <a:fld id="{775CE290-E0F5-444C-B849-A8F17CD4104C}" type="datetimeFigureOut">
               <a:rPr lang="en-US" smtClean="0"/>
-              <a:t>9/12/14</a:t>
+              <a:t>11/16/14</a:t>
             </a:fld>
             <a:endParaRPr lang="en-US"/>
           </a:p>
@@ -375,7 +375,7 @@
           <a:p>
             <a:fld id="{AD53A24C-4135-094C-957B-35852E7EDFA4}" type="datetimeFigureOut">
               <a:rPr lang="en-US" smtClean="0"/>
-              <a:t>9/12/14</a:t>
+              <a:t>11/16/14</a:t>
             </a:fld>
             <a:endParaRPr lang="en-US"/>
           </a:p>
@@ -836,7 +836,7 @@
           <a:p>
             <a:fld id="{722FE9AA-233B-D242-97B8-16339A4EB3AC}" type="datetime2">
               <a:rPr lang="en-US" smtClean="0"/>
-              <a:t>Friday, September 12, 14</a:t>
+              <a:t>Sunday, November 16, 14</a:t>
             </a:fld>
             <a:endParaRPr lang="en-US"/>
           </a:p>
@@ -1139,7 +1139,7 @@
                 <a:latin typeface="Times New Roman"/>
                 <a:cs typeface="Times New Roman"/>
               </a:rPr>
-              <a:t>September 12, 2014</a:t>
+              <a:t>November 16, 2014</a:t>
             </a:fld>
             <a:endParaRPr lang="en-US" dirty="0">
               <a:latin typeface="Times New Roman"/>
@@ -1413,7 +1413,7 @@
                 <a:latin typeface="Times New Roman"/>
                 <a:cs typeface="Times New Roman"/>
               </a:rPr>
-              <a:t>September 12, 2014</a:t>
+              <a:t>November 16, 2014</a:t>
             </a:fld>
             <a:endParaRPr lang="en-US" dirty="0">
               <a:latin typeface="Times New Roman"/>
@@ -1648,7 +1648,7 @@
           <a:p>
             <a:fld id="{EE77B251-8395-6C4B-9D60-8C4B36DEFCD9}" type="datetime2">
               <a:rPr lang="en-US" smtClean="0"/>
-              <a:t>Friday, September 12, 14</a:t>
+              <a:t>Sunday, November 16, 14</a:t>
             </a:fld>
             <a:endParaRPr lang="en-US"/>
           </a:p>
@@ -1959,7 +1959,7 @@
           <a:p>
             <a:fld id="{67070BD3-4250-6F41-9EAD-A2131544771B}" type="datetime2">
               <a:rPr lang="en-US" smtClean="0"/>
-              <a:t>Friday, September 12, 14</a:t>
+              <a:t>Sunday, November 16, 14</a:t>
             </a:fld>
             <a:endParaRPr lang="en-US"/>
           </a:p>
@@ -2130,7 +2130,7 @@
           <a:p>
             <a:fld id="{96A5B809-8F11-3744-9260-56A0BEF3A38C}" type="datetime2">
               <a:rPr lang="en-US" smtClean="0"/>
-              <a:t>Friday, September 12, 14</a:t>
+              <a:t>Sunday, November 16, 14</a:t>
             </a:fld>
             <a:endParaRPr lang="en-US"/>
           </a:p>
@@ -2311,7 +2311,7 @@
           <a:p>
             <a:fld id="{0F740D3A-6CF8-0643-ADBD-D37B963671C0}" type="datetime2">
               <a:rPr lang="en-US" smtClean="0"/>
-              <a:t>Friday, September 12, 14</a:t>
+              <a:t>Sunday, November 16, 14</a:t>
             </a:fld>
             <a:endParaRPr lang="en-US"/>
           </a:p>
@@ -2565,7 +2565,7 @@
           <a:p>
             <a:fld id="{787F9449-54CC-8F4B-8654-A07E975050FA}" type="datetime2">
               <a:rPr lang="en-US" smtClean="0"/>
-              <a:t>Friday, September 12, 14</a:t>
+              <a:t>Sunday, November 16, 14</a:t>
             </a:fld>
             <a:endParaRPr lang="en-US"/>
           </a:p>
@@ -2868,7 +2868,7 @@
                 <a:latin typeface="Times New Roman"/>
                 <a:cs typeface="Times New Roman"/>
               </a:rPr>
-              <a:t>September 12, 2014</a:t>
+              <a:t>November 16, 2014</a:t>
             </a:fld>
             <a:endParaRPr lang="en-US" dirty="0">
               <a:latin typeface="Times New Roman"/>
@@ -2994,7 +2994,7 @@
           <a:p>
             <a:fld id="{DC4060BC-378E-A84C-B452-7EDB9CCD245C}" type="datetime2">
               <a:rPr lang="en-US" smtClean="0"/>
-              <a:t>Friday, September 12, 14</a:t>
+              <a:t>Sunday, November 16, 14</a:t>
             </a:fld>
             <a:endParaRPr lang="en-US" dirty="0"/>
           </a:p>
@@ -3523,7 +3523,7 @@
           <a:p>
             <a:fld id="{1E4E736E-2C6E-3B44-86FD-BCD331CC4538}" type="datetime2">
               <a:rPr lang="en-US" smtClean="0"/>
-              <a:t>Friday, September 12, 14</a:t>
+              <a:t>Sunday, November 16, 14</a:t>
             </a:fld>
             <a:endParaRPr lang="en-US" dirty="0"/>
           </a:p>
@@ -3819,7 +3819,7 @@
           <a:p>
             <a:fld id="{84D4C779-871D-E44B-9C91-90B0D25A5442}" type="datetime2">
               <a:rPr lang="en-US" smtClean="0"/>
-              <a:t>Friday, September 12, 14</a:t>
+              <a:t>Sunday, November 16, 14</a:t>
             </a:fld>
             <a:endParaRPr lang="en-US"/>
           </a:p>
@@ -3938,7 +3938,7 @@
           <a:p>
             <a:fld id="{6D043B0B-7C47-C645-8463-C75643093DE3}" type="datetime2">
               <a:rPr lang="en-US" smtClean="0"/>
-              <a:t>Friday, September 12, 14</a:t>
+              <a:t>Sunday, November 16, 14</a:t>
             </a:fld>
             <a:endParaRPr lang="en-US" dirty="0"/>
           </a:p>
@@ -4425,7 +4425,7 @@
           <a:p>
             <a:fld id="{CAA7EB55-EEA0-5349-AA10-20F4F1A62B0F}" type="datetime2">
               <a:rPr lang="en-US" smtClean="0"/>
-              <a:t>Friday, September 12, 14</a:t>
+              <a:t>Sunday, November 16, 14</a:t>
             </a:fld>
             <a:endParaRPr lang="en-US"/>
           </a:p>
@@ -4756,7 +4756,7 @@
           <a:p>
             <a:fld id="{730A527B-0398-CC43-81C7-C482DF8661A9}" type="datetime2">
               <a:rPr lang="en-US" smtClean="0"/>
-              <a:t>Friday, September 12, 14</a:t>
+              <a:t>Sunday, November 16, 14</a:t>
             </a:fld>
             <a:endParaRPr lang="en-US" dirty="0"/>
           </a:p>
@@ -5235,7 +5235,7 @@
           <a:p>
             <a:fld id="{D4F44179-0846-6348-991D-483DF810BDA3}" type="datetime2">
               <a:rPr lang="en-US" smtClean="0"/>
-              <a:t>Friday, September 12, 14</a:t>
+              <a:t>Sunday, November 16, 14</a:t>
             </a:fld>
             <a:endParaRPr lang="en-US"/>
           </a:p>
@@ -5531,7 +5531,7 @@
           <a:p>
             <a:fld id="{CBA2A2A2-850E-A547-989F-C7B53694B3E7}" type="datetime2">
               <a:rPr lang="en-US" smtClean="0"/>
-              <a:t>Friday, September 12, 14</a:t>
+              <a:t>Sunday, November 16, 14</a:t>
             </a:fld>
             <a:endParaRPr lang="en-US" dirty="0"/>
           </a:p>
@@ -5774,7 +5774,7 @@
           <a:p>
             <a:fld id="{145AFA66-68DA-F54A-8DA5-3ECDEBF9DF7B}" type="datetime2">
               <a:rPr lang="en-US" smtClean="0"/>
-              <a:t>Friday, September 12, 14</a:t>
+              <a:t>Sunday, November 16, 14</a:t>
             </a:fld>
             <a:endParaRPr lang="en-US"/>
           </a:p>
@@ -5870,7 +5870,7 @@
           <a:p>
             <a:fld id="{D0245D12-019F-6346-838B-436C2C9B1538}" type="datetime2">
               <a:rPr lang="en-US" smtClean="0"/>
-              <a:t>Friday, September 12, 14</a:t>
+              <a:t>Sunday, November 16, 14</a:t>
             </a:fld>
             <a:endParaRPr lang="en-US"/>
           </a:p>
@@ -6185,7 +6185,7 @@
           <a:p>
             <a:fld id="{DDE5C39F-35D2-CF40-B60A-C7EB9BA257A2}" type="datetime2">
               <a:rPr lang="en-US" smtClean="0"/>
-              <a:t>Friday, September 12, 14</a:t>
+              <a:t>Sunday, November 16, 14</a:t>
             </a:fld>
             <a:endParaRPr lang="en-US" dirty="0"/>
           </a:p>
@@ -7635,8 +7635,21 @@
           <a:p>
             <a:r>
               <a:rPr lang="en-US" dirty="0"/>
-              <a:t>Tools of aggregated performance viewing</a:t>
-            </a:r>
+              <a:t>A</a:t>
+            </a:r>
+            <a:r>
+              <a:rPr lang="en-US" dirty="0" smtClean="0"/>
+              <a:t>ggregated </a:t>
+            </a:r>
+            <a:r>
+              <a:rPr lang="en-US" dirty="0"/>
+              <a:t>performance </a:t>
+            </a:r>
+            <a:r>
+              <a:rPr lang="en-US" dirty="0" smtClean="0"/>
+              <a:t>viewing tools</a:t>
+            </a:r>
+            <a:endParaRPr lang="en-US" dirty="0"/>
           </a:p>
           <a:p>
             <a:pPr lvl="1"/>
@@ -7670,9 +7683,18 @@
           </a:p>
           <a:p>
             <a:r>
+              <a:rPr lang="en-US" dirty="0" smtClean="0"/>
+              <a:t>Processor </a:t>
+            </a:r>
+            <a:r>
               <a:rPr lang="en-US" dirty="0"/>
-              <a:t>Tools of processor level granularity</a:t>
-            </a:r>
+              <a:t>level </a:t>
+            </a:r>
+            <a:r>
+              <a:rPr lang="en-US" dirty="0" smtClean="0"/>
+              <a:t>granularity tools</a:t>
+            </a:r>
+            <a:endParaRPr lang="en-US" dirty="0"/>
           </a:p>
           <a:p>
             <a:pPr lvl="1"/>
@@ -7692,8 +7714,21 @@
           <a:p>
             <a:r>
               <a:rPr lang="en-US" dirty="0"/>
-              <a:t>Tools of derived/processed data</a:t>
-            </a:r>
+              <a:t>D</a:t>
+            </a:r>
+            <a:r>
+              <a:rPr lang="en-US" dirty="0" smtClean="0"/>
+              <a:t>erived</a:t>
+            </a:r>
+            <a:r>
+              <a:rPr lang="en-US" dirty="0"/>
+              <a:t>/processed </a:t>
+            </a:r>
+            <a:r>
+              <a:rPr lang="en-US" dirty="0" smtClean="0"/>
+              <a:t>data tools</a:t>
+            </a:r>
+            <a:endParaRPr lang="en-US" dirty="0"/>
           </a:p>
           <a:p>
             <a:pPr lvl="1"/>
@@ -8859,8 +8894,12 @@
           <a:lstStyle/>
           <a:p>
             <a:r>
+              <a:rPr lang="en-US" dirty="0" smtClean="0"/>
+              <a:t>Timeline </a:t>
+            </a:r>
+            <a:r>
               <a:rPr lang="en-US" dirty="0"/>
-              <a:t>Time Lines with Message Back Tracing</a:t>
+              <a:t>with Message Back Tracing</a:t>
             </a:r>
           </a:p>
         </p:txBody>

</xml_diff>